<commit_message>
Some minor alterations - added a new slides, re-ordered some, minor text changes
</commit_message>
<xml_diff>
--- a/presentation/DevTools_Presentation_270912.pptx
+++ b/presentation/DevTools_Presentation_270912.pptx
@@ -7,8 +7,8 @@
   <p:sldIdLst>
     <p:sldId id="256" r:id="rId2"/>
     <p:sldId id="257" r:id="rId3"/>
-    <p:sldId id="258" r:id="rId4"/>
-    <p:sldId id="266" r:id="rId5"/>
+    <p:sldId id="266" r:id="rId4"/>
+    <p:sldId id="258" r:id="rId5"/>
     <p:sldId id="265" r:id="rId6"/>
     <p:sldId id="259" r:id="rId7"/>
     <p:sldId id="262" r:id="rId8"/>
@@ -24,7 +24,8 @@
     <p:sldId id="272" r:id="rId18"/>
     <p:sldId id="261" r:id="rId19"/>
     <p:sldId id="273" r:id="rId20"/>
-    <p:sldId id="274" r:id="rId21"/>
+    <p:sldId id="276" r:id="rId21"/>
+    <p:sldId id="274" r:id="rId22"/>
   </p:sldIdLst>
   <p:sldSz cx="9144000" cy="6858000" type="screen4x3"/>
   <p:notesSz cx="6858000" cy="9144000"/>
@@ -512,7 +513,7 @@
             <a:fld id="{E637BB6B-EE1B-48FB-8575-0D55C373DE88}" type="datetimeFigureOut">
               <a:rPr lang="en-US" smtClean="0"/>
               <a:pPr eaLnBrk="1" latinLnBrk="0" hangingPunct="1"/>
-              <a:t>26/09/2012</a:t>
+              <a:t>27/09/2012</a:t>
             </a:fld>
             <a:endParaRPr lang="en-US"/>
           </a:p>
@@ -680,7 +681,7 @@
             <a:fld id="{E637BB6B-EE1B-48FB-8575-0D55C373DE88}" type="datetimeFigureOut">
               <a:rPr lang="en-US" smtClean="0"/>
               <a:pPr eaLnBrk="1" latinLnBrk="0" hangingPunct="1"/>
-              <a:t>26/09/2012</a:t>
+              <a:t>27/09/2012</a:t>
             </a:fld>
             <a:endParaRPr lang="en-US" dirty="0"/>
           </a:p>
@@ -858,7 +859,7 @@
             <a:fld id="{E637BB6B-EE1B-48FB-8575-0D55C373DE88}" type="datetimeFigureOut">
               <a:rPr lang="en-US" smtClean="0"/>
               <a:pPr eaLnBrk="1" latinLnBrk="0" hangingPunct="1"/>
-              <a:t>26/09/2012</a:t>
+              <a:t>27/09/2012</a:t>
             </a:fld>
             <a:endParaRPr lang="en-US"/>
           </a:p>
@@ -1030,7 +1031,7 @@
             <a:fld id="{E637BB6B-EE1B-48FB-8575-0D55C373DE88}" type="datetimeFigureOut">
               <a:rPr lang="en-US" smtClean="0"/>
               <a:pPr eaLnBrk="1" latinLnBrk="0" hangingPunct="1"/>
-              <a:t>26/09/2012</a:t>
+              <a:t>27/09/2012</a:t>
             </a:fld>
             <a:endParaRPr lang="en-US"/>
           </a:p>
@@ -1488,7 +1489,7 @@
             <a:fld id="{E637BB6B-EE1B-48FB-8575-0D55C373DE88}" type="datetimeFigureOut">
               <a:rPr lang="en-US" smtClean="0"/>
               <a:pPr eaLnBrk="1" latinLnBrk="0" hangingPunct="1"/>
-              <a:t>26/09/2012</a:t>
+              <a:t>27/09/2012</a:t>
             </a:fld>
             <a:endParaRPr lang="en-US"/>
           </a:p>
@@ -1755,7 +1756,7 @@
             <a:fld id="{E637BB6B-EE1B-48FB-8575-0D55C373DE88}" type="datetimeFigureOut">
               <a:rPr lang="en-US" smtClean="0"/>
               <a:pPr eaLnBrk="1" latinLnBrk="0" hangingPunct="1"/>
-              <a:t>26/09/2012</a:t>
+              <a:t>27/09/2012</a:t>
             </a:fld>
             <a:endParaRPr lang="en-US"/>
           </a:p>
@@ -2132,7 +2133,7 @@
             <a:fld id="{E637BB6B-EE1B-48FB-8575-0D55C373DE88}" type="datetimeFigureOut">
               <a:rPr lang="en-US" smtClean="0"/>
               <a:pPr eaLnBrk="1" latinLnBrk="0" hangingPunct="1"/>
-              <a:t>26/09/2012</a:t>
+              <a:t>27/09/2012</a:t>
             </a:fld>
             <a:endParaRPr lang="en-US"/>
           </a:p>
@@ -2257,7 +2258,7 @@
             <a:fld id="{E637BB6B-EE1B-48FB-8575-0D55C373DE88}" type="datetimeFigureOut">
               <a:rPr lang="en-US" smtClean="0"/>
               <a:pPr eaLnBrk="1" latinLnBrk="0" hangingPunct="1"/>
-              <a:t>26/09/2012</a:t>
+              <a:t>27/09/2012</a:t>
             </a:fld>
             <a:endParaRPr lang="en-US"/>
           </a:p>
@@ -2350,7 +2351,7 @@
             <a:fld id="{E637BB6B-EE1B-48FB-8575-0D55C373DE88}" type="datetimeFigureOut">
               <a:rPr lang="en-US" smtClean="0"/>
               <a:pPr eaLnBrk="1" latinLnBrk="0" hangingPunct="1"/>
-              <a:t>26/09/2012</a:t>
+              <a:t>27/09/2012</a:t>
             </a:fld>
             <a:endParaRPr lang="en-US"/>
           </a:p>
@@ -2602,7 +2603,7 @@
             <a:fld id="{E637BB6B-EE1B-48FB-8575-0D55C373DE88}" type="datetimeFigureOut">
               <a:rPr lang="en-US" smtClean="0"/>
               <a:pPr eaLnBrk="1" latinLnBrk="0" hangingPunct="1"/>
-              <a:t>26/09/2012</a:t>
+              <a:t>27/09/2012</a:t>
             </a:fld>
             <a:endParaRPr lang="en-US"/>
           </a:p>
@@ -2864,7 +2865,7 @@
             <a:fld id="{E637BB6B-EE1B-48FB-8575-0D55C373DE88}" type="datetimeFigureOut">
               <a:rPr lang="en-US" smtClean="0"/>
               <a:pPr eaLnBrk="1" latinLnBrk="0" hangingPunct="1"/>
-              <a:t>26/09/2012</a:t>
+              <a:t>27/09/2012</a:t>
             </a:fld>
             <a:endParaRPr lang="en-US"/>
           </a:p>
@@ -3271,7 +3272,7 @@
             <a:fld id="{E637BB6B-EE1B-48FB-8575-0D55C373DE88}" type="datetimeFigureOut">
               <a:rPr lang="en-US" smtClean="0"/>
               <a:pPr eaLnBrk="1" latinLnBrk="0" hangingPunct="1"/>
-              <a:t>26/09/2012</a:t>
+              <a:t>27/09/2012</a:t>
             </a:fld>
             <a:endParaRPr lang="en-US" sz="1000">
               <a:solidFill>
@@ -4733,10 +4734,15 @@
             <p:ph idx="1"/>
           </p:nvPr>
         </p:nvSpPr>
-        <p:spPr/>
+        <p:spPr>
+          <a:xfrm>
+            <a:off x="457200" y="1600200"/>
+            <a:ext cx="7467600" cy="4704297"/>
+          </a:xfrm>
+        </p:spPr>
         <p:txBody>
           <a:bodyPr>
-            <a:normAutofit fontScale="92500" lnSpcReduction="10000"/>
+            <a:normAutofit fontScale="85000" lnSpcReduction="10000"/>
           </a:bodyPr>
           <a:lstStyle/>
           <a:p>
@@ -4765,9 +4771,14 @@
           <a:p>
             <a:pPr lvl="1"/>
             <a:r>
-              <a:rPr lang="en-US" dirty="0" smtClean="0"/>
-              <a:t>Python</a:t>
-            </a:r>
+              <a:rPr lang="en-US" dirty="0"/>
+              <a:t>“Fabric is a Python (2.5 or higher) library and command-line tool for streamlining the use of SSH for application deployment or systems administration tasks.</a:t>
+            </a:r>
+            <a:r>
+              <a:rPr lang="en-US" dirty="0" smtClean="0"/>
+              <a:t>”</a:t>
+            </a:r>
+            <a:endParaRPr lang="en-US" dirty="0" smtClean="0"/>
           </a:p>
           <a:p>
             <a:pPr lvl="1"/>
@@ -4946,7 +4957,6 @@
               <a:rPr lang="en-US" dirty="0" smtClean="0"/>
               <a:t>Don’t be afraid of the ‘cloud’</a:t>
             </a:r>
-            <a:endParaRPr lang="en-US" dirty="0" smtClean="0"/>
           </a:p>
           <a:p>
             <a:pPr marL="36576" indent="0">
@@ -5118,16 +5128,11 @@
           <a:p>
             <a:r>
               <a:rPr lang="en-US" dirty="0" smtClean="0"/>
-              <a:t>Audience poll ……</a:t>
-            </a:r>
-          </a:p>
-          <a:p>
-            <a:endParaRPr lang="en-US" dirty="0" smtClean="0"/>
-          </a:p>
-          <a:p>
-            <a:r>
-              <a:rPr lang="en-US" dirty="0" smtClean="0"/>
-              <a:t>Other tools exist! </a:t>
+              <a:t>Other </a:t>
+            </a:r>
+            <a:r>
+              <a:rPr lang="en-US" dirty="0" smtClean="0"/>
+              <a:t>tools exist! </a:t>
             </a:r>
           </a:p>
           <a:p>
@@ -5211,11 +5216,167 @@
           <a:lstStyle/>
           <a:p>
             <a:r>
-              <a:rPr lang="en-US" dirty="0" smtClean="0"/>
-              <a:t>Q&amp;A</a:t>
+              <a:rPr lang="en-US" dirty="0"/>
+              <a:t>Other useful tools</a:t>
+            </a:r>
+          </a:p>
+        </p:txBody>
+      </p:sp>
+      <p:sp>
+        <p:nvSpPr>
+          <p:cNvPr id="3" name="Content Placeholder 2"/>
+          <p:cNvSpPr>
+            <a:spLocks noGrp="1"/>
+          </p:cNvSpPr>
+          <p:nvPr>
+            <p:ph idx="1"/>
+          </p:nvPr>
+        </p:nvSpPr>
+        <p:spPr/>
+        <p:txBody>
+          <a:bodyPr>
+            <a:normAutofit lnSpcReduction="10000"/>
+          </a:bodyPr>
+          <a:lstStyle/>
+          <a:p>
+            <a:r>
+              <a:rPr lang="en-US" dirty="0" err="1"/>
+              <a:t>Pingdom</a:t>
+            </a:r>
+            <a:r>
+              <a:rPr lang="en-US" dirty="0"/>
+              <a:t> </a:t>
+            </a:r>
+          </a:p>
+          <a:p>
+            <a:pPr lvl="1"/>
+            <a:r>
+              <a:rPr lang="en-US" dirty="0">
+                <a:hlinkClick r:id="rId2"/>
+              </a:rPr>
+              <a:t>https://www.pingdom.com</a:t>
             </a:r>
             <a:endParaRPr lang="en-US" dirty="0"/>
           </a:p>
+          <a:p>
+            <a:pPr lvl="1"/>
+            <a:r>
+              <a:rPr lang="en-US" dirty="0"/>
+              <a:t>Nice uptime graphs for reports!</a:t>
+            </a:r>
+          </a:p>
+          <a:p>
+            <a:pPr lvl="1"/>
+            <a:endParaRPr lang="en-US" dirty="0"/>
+          </a:p>
+          <a:p>
+            <a:r>
+              <a:rPr lang="en-US" dirty="0" err="1"/>
+              <a:t>VisualVM</a:t>
+            </a:r>
+            <a:r>
+              <a:rPr lang="en-US" dirty="0"/>
+              <a:t> (for Java)</a:t>
+            </a:r>
+          </a:p>
+          <a:p>
+            <a:pPr lvl="1"/>
+            <a:r>
+              <a:rPr lang="en-US" dirty="0"/>
+              <a:t>Monitor memory, threads </a:t>
+            </a:r>
+            <a:r>
+              <a:rPr lang="en-US" dirty="0" err="1"/>
+              <a:t>etc</a:t>
+            </a:r>
+            <a:endParaRPr lang="en-US" dirty="0"/>
+          </a:p>
+          <a:p>
+            <a:endParaRPr lang="en-US" dirty="0"/>
+          </a:p>
+          <a:p>
+            <a:r>
+              <a:rPr lang="en-US" dirty="0" err="1"/>
+              <a:t>Testflight</a:t>
+            </a:r>
+            <a:r>
+              <a:rPr lang="en-US" dirty="0"/>
+              <a:t> (for </a:t>
+            </a:r>
+            <a:r>
+              <a:rPr lang="en-US" dirty="0" err="1"/>
+              <a:t>iOS</a:t>
+            </a:r>
+            <a:r>
+              <a:rPr lang="en-US" dirty="0"/>
+              <a:t> apps)</a:t>
+            </a:r>
+          </a:p>
+          <a:p>
+            <a:pPr lvl="1"/>
+            <a:r>
+              <a:rPr lang="en-US" dirty="0"/>
+              <a:t>https://</a:t>
+            </a:r>
+            <a:r>
+              <a:rPr lang="en-US"/>
+              <a:t>testflightapp.com</a:t>
+            </a:r>
+            <a:endParaRPr lang="en-US" dirty="0"/>
+          </a:p>
+        </p:txBody>
+      </p:sp>
+    </p:spTree>
+    <p:extLst>
+      <p:ext uri="{BB962C8B-B14F-4D97-AF65-F5344CB8AC3E}">
+        <p14:creationId xmlns:p14="http://schemas.microsoft.com/office/powerpoint/2010/main" val="1651184184"/>
+      </p:ext>
+    </p:extLst>
+  </p:cSld>
+  <p:clrMapOvr>
+    <a:masterClrMapping/>
+  </p:clrMapOvr>
+</p:sld>
+</file>
+
+<file path=ppt/slides/slide21.xml><?xml version="1.0" encoding="utf-8"?>
+<p:sld xmlns:a="http://schemas.openxmlformats.org/drawingml/2006/main" xmlns:r="http://schemas.openxmlformats.org/officeDocument/2006/relationships" xmlns:p="http://schemas.openxmlformats.org/presentationml/2006/main">
+  <p:cSld>
+    <p:spTree>
+      <p:nvGrpSpPr>
+        <p:cNvPr id="1" name=""/>
+        <p:cNvGrpSpPr/>
+        <p:nvPr/>
+      </p:nvGrpSpPr>
+      <p:grpSpPr>
+        <a:xfrm>
+          <a:off x="0" y="0"/>
+          <a:ext cx="0" cy="0"/>
+          <a:chOff x="0" y="0"/>
+          <a:chExt cx="0" cy="0"/>
+        </a:xfrm>
+      </p:grpSpPr>
+      <p:sp>
+        <p:nvSpPr>
+          <p:cNvPr id="2" name="Title 1"/>
+          <p:cNvSpPr>
+            <a:spLocks noGrp="1"/>
+          </p:cNvSpPr>
+          <p:nvPr>
+            <p:ph type="title"/>
+          </p:nvPr>
+        </p:nvSpPr>
+        <p:spPr/>
+        <p:txBody>
+          <a:bodyPr/>
+          <a:lstStyle/>
+          <a:p>
+            <a:r>
+              <a:rPr lang="en-US" dirty="0" smtClean="0"/>
+              <a:t>Thanks</a:t>
+            </a:r>
+            <a:endParaRPr lang="en-US" dirty="0"/>
+          </a:p>
         </p:txBody>
       </p:sp>
       <p:sp>
@@ -5234,8 +5395,8 @@
           <a:lstStyle/>
           <a:p>
             <a:r>
-              <a:rPr lang="en-US" dirty="0" smtClean="0"/>
-              <a:t>Questions?</a:t>
+              <a:rPr lang="en-US" dirty="0"/>
+              <a:t>Discussion time.</a:t>
             </a:r>
             <a:endParaRPr lang="en-US" dirty="0"/>
           </a:p>
@@ -5288,7 +5449,7 @@
           <a:p>
             <a:r>
               <a:rPr lang="en-US" dirty="0" smtClean="0"/>
-              <a:t>Learn by example</a:t>
+              <a:t>Info</a:t>
             </a:r>
             <a:endParaRPr lang="en-US" dirty="0"/>
           </a:p>
@@ -5306,93 +5467,78 @@
         </p:nvSpPr>
         <p:spPr/>
         <p:txBody>
-          <a:bodyPr/>
-          <a:lstStyle/>
-          <a:p>
+          <a:bodyPr>
+            <a:normAutofit/>
+          </a:bodyPr>
+          <a:lstStyle/>
+          <a:p>
+            <a:r>
+              <a:rPr lang="en-US" dirty="0" smtClean="0"/>
+              <a:t>Movies are more fun than slides</a:t>
+            </a:r>
+          </a:p>
+          <a:p>
+            <a:r>
+              <a:rPr lang="en-US" dirty="0">
+                <a:hlinkClick r:id="rId2"/>
+              </a:rPr>
+              <a:t>http://www.youtube.com/playlist?list=</a:t>
+            </a:r>
+            <a:r>
+              <a:rPr lang="en-US" dirty="0" smtClean="0">
+                <a:hlinkClick r:id="rId2"/>
+              </a:rPr>
+              <a:t>PL_tNVIp2JMcXm1sLIUBpcnBPAJvCC8eEi</a:t>
+            </a:r>
+            <a:endParaRPr lang="en-US" dirty="0"/>
+          </a:p>
+          <a:p>
+            <a:r>
+              <a:rPr lang="en-US" dirty="0" smtClean="0"/>
+              <a:t>All source code is in </a:t>
+            </a:r>
+            <a:r>
+              <a:rPr lang="en-US" dirty="0" err="1" smtClean="0"/>
+              <a:t>GitHub</a:t>
+            </a:r>
             <a:r>
               <a:rPr lang="en-US" dirty="0"/>
-              <a:t>Comparing Development Tools and </a:t>
-            </a:r>
-            <a:r>
-              <a:rPr lang="en-US" dirty="0" smtClean="0"/>
-              <a:t>Environments</a:t>
-            </a:r>
-          </a:p>
-          <a:p>
-            <a:endParaRPr lang="en-US" dirty="0"/>
-          </a:p>
-          <a:p>
+              <a:t>: </a:t>
+            </a:r>
+            <a:r>
+              <a:rPr lang="en-US" dirty="0">
+                <a:hlinkClick r:id="rId3"/>
+              </a:rPr>
+              <a:t>https://github.com/gwaller/</a:t>
+            </a:r>
+            <a:r>
+              <a:rPr lang="en-US" dirty="0" smtClean="0">
+                <a:hlinkClick r:id="rId3"/>
+              </a:rPr>
+              <a:t>DevToolsPresentation</a:t>
+            </a:r>
             <a:endParaRPr lang="en-US" dirty="0" smtClean="0"/>
           </a:p>
           <a:p>
-            <a:endParaRPr lang="en-US" dirty="0"/>
-          </a:p>
-          <a:p>
-            <a:r>
-              <a:rPr lang="en-US" dirty="0" smtClean="0"/>
-              <a:t>Building </a:t>
+            <a:r>
+              <a:rPr lang="en-US" dirty="0" smtClean="0"/>
+              <a:t>Amazon machine image for Hudson and </a:t>
             </a:r>
             <a:r>
               <a:rPr lang="en-US" dirty="0" err="1" smtClean="0"/>
               <a:t>PhotoView</a:t>
             </a:r>
-            <a:r>
-              <a:rPr lang="en-US" dirty="0" smtClean="0"/>
-              <a:t> v1.0 </a:t>
-            </a:r>
-          </a:p>
-          <a:p>
-            <a:pPr lvl="1"/>
-            <a:r>
-              <a:rPr lang="en-US" dirty="0" smtClean="0"/>
-              <a:t>Release date today!</a:t>
-            </a:r>
+            <a:endParaRPr lang="en-US" dirty="0" smtClean="0"/>
+          </a:p>
+          <a:p>
             <a:endParaRPr lang="en-US" dirty="0"/>
-          </a:p>
-        </p:txBody>
-      </p:sp>
-      <p:sp>
-        <p:nvSpPr>
-          <p:cNvPr id="8" name="Down Arrow 7"/>
-          <p:cNvSpPr/>
-          <p:nvPr/>
-        </p:nvSpPr>
-        <p:spPr>
-          <a:xfrm>
-            <a:off x="2090617" y="2999149"/>
-            <a:ext cx="484632" cy="978408"/>
-          </a:xfrm>
-          <a:prstGeom prst="downArrow">
-            <a:avLst/>
-          </a:prstGeom>
-        </p:spPr>
-        <p:style>
-          <a:lnRef idx="1">
-            <a:schemeClr val="accent1"/>
-          </a:lnRef>
-          <a:fillRef idx="3">
-            <a:schemeClr val="accent1"/>
-          </a:fillRef>
-          <a:effectRef idx="2">
-            <a:schemeClr val="accent1"/>
-          </a:effectRef>
-          <a:fontRef idx="minor">
-            <a:schemeClr val="lt1"/>
-          </a:fontRef>
-        </p:style>
-        <p:txBody>
-          <a:bodyPr rtlCol="0" anchor="ctr"/>
-          <a:lstStyle/>
-          <a:p>
-            <a:pPr algn="ctr"/>
-            <a:endParaRPr lang="en-US"/>
           </a:p>
         </p:txBody>
       </p:sp>
     </p:spTree>
     <p:extLst>
       <p:ext uri="{BB962C8B-B14F-4D97-AF65-F5344CB8AC3E}">
-        <p14:creationId xmlns:p14="http://schemas.microsoft.com/office/powerpoint/2010/main" val="4155736443"/>
+        <p14:creationId xmlns:p14="http://schemas.microsoft.com/office/powerpoint/2010/main" val="1488276263"/>
       </p:ext>
     </p:extLst>
   </p:cSld>
@@ -5443,7 +5589,7 @@
           <a:p>
             <a:r>
               <a:rPr lang="en-US" dirty="0" smtClean="0"/>
-              <a:t>Info</a:t>
+              <a:t>Learn by example</a:t>
             </a:r>
             <a:endParaRPr lang="en-US" dirty="0"/>
           </a:p>
@@ -5462,77 +5608,111 @@
         <p:spPr/>
         <p:txBody>
           <a:bodyPr>
-            <a:normAutofit/>
+            <a:normAutofit fontScale="92500" lnSpcReduction="10000"/>
           </a:bodyPr>
           <a:lstStyle/>
           <a:p>
             <a:r>
-              <a:rPr lang="en-US" dirty="0" smtClean="0"/>
-              <a:t>Movies are more fun than slides</a:t>
-            </a:r>
-          </a:p>
-          <a:p>
-            <a:r>
-              <a:rPr lang="en-US" dirty="0">
-                <a:hlinkClick r:id="rId2"/>
-              </a:rPr>
-              <a:t>http://www.youtube.com/playlist?list=</a:t>
-            </a:r>
-            <a:r>
-              <a:rPr lang="en-US" dirty="0" smtClean="0">
-                <a:hlinkClick r:id="rId2"/>
-              </a:rPr>
-              <a:t>PL_tNVIp2JMcXm1sLIUBpcnBPAJvCC8eEi</a:t>
-            </a:r>
+              <a:rPr lang="en-US" dirty="0"/>
+              <a:t>Comparing Development Tools and </a:t>
+            </a:r>
+            <a:r>
+              <a:rPr lang="en-US" dirty="0" smtClean="0"/>
+              <a:t>Environments</a:t>
+            </a:r>
+          </a:p>
+          <a:p>
             <a:endParaRPr lang="en-US" dirty="0"/>
           </a:p>
           <a:p>
-            <a:r>
-              <a:rPr lang="en-US" dirty="0" smtClean="0"/>
-              <a:t>All source code is in </a:t>
-            </a:r>
-            <a:r>
-              <a:rPr lang="en-US" dirty="0" err="1" smtClean="0"/>
-              <a:t>GitHub</a:t>
+            <a:endParaRPr lang="en-US" dirty="0" smtClean="0"/>
+          </a:p>
+          <a:p>
+            <a:endParaRPr lang="en-US" dirty="0"/>
+          </a:p>
+          <a:p>
+            <a:r>
+              <a:rPr lang="en-US" dirty="0" err="1"/>
+              <a:t>PhotoView</a:t>
             </a:r>
             <a:r>
               <a:rPr lang="en-US" dirty="0"/>
-              <a:t>: </a:t>
-            </a:r>
-            <a:r>
-              <a:rPr lang="en-US" dirty="0">
-                <a:hlinkClick r:id="rId3"/>
-              </a:rPr>
-              <a:t>https://github.com/gwaller/</a:t>
-            </a:r>
-            <a:r>
-              <a:rPr lang="en-US" dirty="0" smtClean="0">
-                <a:hlinkClick r:id="rId3"/>
-              </a:rPr>
-              <a:t>DevToolsPresentation</a:t>
-            </a:r>
-            <a:endParaRPr lang="en-US" dirty="0" smtClean="0"/>
-          </a:p>
-          <a:p>
-            <a:r>
-              <a:rPr lang="en-US" dirty="0" smtClean="0"/>
-              <a:t>Amazon machine image for Hudson and </a:t>
-            </a:r>
-            <a:r>
-              <a:rPr lang="en-US" dirty="0" err="1" smtClean="0"/>
-              <a:t>PhotoView</a:t>
-            </a:r>
-            <a:endParaRPr lang="en-US" dirty="0" smtClean="0"/>
-          </a:p>
-          <a:p>
+              <a:t> v1.0 </a:t>
+            </a:r>
+          </a:p>
+          <a:p>
+            <a:pPr lvl="1"/>
+            <a:r>
+              <a:rPr lang="en-US" dirty="0"/>
+              <a:t>Release date today!</a:t>
+            </a:r>
+          </a:p>
+          <a:p>
+            <a:pPr lvl="1"/>
+            <a:r>
+              <a:rPr lang="en-US" dirty="0"/>
+              <a:t>How to plan</a:t>
+            </a:r>
+          </a:p>
+          <a:p>
+            <a:pPr lvl="1"/>
+            <a:r>
+              <a:rPr lang="en-US" dirty="0"/>
+              <a:t>How to build</a:t>
+            </a:r>
+          </a:p>
+          <a:p>
+            <a:pPr lvl="1"/>
+            <a:r>
+              <a:rPr lang="en-US" dirty="0"/>
+              <a:t>How to release</a:t>
+            </a:r>
             <a:endParaRPr lang="en-US" dirty="0"/>
+          </a:p>
+        </p:txBody>
+      </p:sp>
+      <p:sp>
+        <p:nvSpPr>
+          <p:cNvPr id="8" name="Down Arrow 7"/>
+          <p:cNvSpPr/>
+          <p:nvPr/>
+        </p:nvSpPr>
+        <p:spPr>
+          <a:xfrm>
+            <a:off x="2090617" y="2723489"/>
+            <a:ext cx="484632" cy="978408"/>
+          </a:xfrm>
+          <a:prstGeom prst="downArrow">
+            <a:avLst/>
+          </a:prstGeom>
+        </p:spPr>
+        <p:style>
+          <a:lnRef idx="1">
+            <a:schemeClr val="accent1"/>
+          </a:lnRef>
+          <a:fillRef idx="3">
+            <a:schemeClr val="accent1"/>
+          </a:fillRef>
+          <a:effectRef idx="2">
+            <a:schemeClr val="accent1"/>
+          </a:effectRef>
+          <a:fontRef idx="minor">
+            <a:schemeClr val="lt1"/>
+          </a:fontRef>
+        </p:style>
+        <p:txBody>
+          <a:bodyPr rtlCol="0" anchor="ctr"/>
+          <a:lstStyle/>
+          <a:p>
+            <a:pPr algn="ctr"/>
+            <a:endParaRPr lang="en-US"/>
           </a:p>
         </p:txBody>
       </p:sp>
     </p:spTree>
     <p:extLst>
       <p:ext uri="{BB962C8B-B14F-4D97-AF65-F5344CB8AC3E}">
-        <p14:creationId xmlns:p14="http://schemas.microsoft.com/office/powerpoint/2010/main" val="1488276263"/>
+        <p14:creationId xmlns:p14="http://schemas.microsoft.com/office/powerpoint/2010/main" val="4155736443"/>
       </p:ext>
     </p:extLst>
   </p:cSld>
@@ -6090,10 +6270,15 @@
             <p:ph idx="1"/>
           </p:nvPr>
         </p:nvSpPr>
-        <p:spPr/>
+        <p:spPr>
+          <a:xfrm>
+            <a:off x="457200" y="1600200"/>
+            <a:ext cx="7467600" cy="4944577"/>
+          </a:xfrm>
+        </p:spPr>
         <p:txBody>
           <a:bodyPr>
-            <a:normAutofit lnSpcReduction="10000"/>
+            <a:normAutofit fontScale="85000" lnSpcReduction="20000"/>
           </a:bodyPr>
           <a:lstStyle/>
           <a:p>
@@ -6109,8 +6294,46 @@
           <a:p>
             <a:r>
               <a:rPr lang="en-US" dirty="0" smtClean="0"/>
-              <a:t>MVC design pattern</a:t>
-            </a:r>
+              <a:t>MVC design </a:t>
+            </a:r>
+            <a:r>
+              <a:rPr lang="en-US" dirty="0" smtClean="0"/>
+              <a:t>pattern</a:t>
+            </a:r>
+          </a:p>
+          <a:p>
+            <a:pPr lvl="1"/>
+            <a:r>
+              <a:rPr lang="en-US" dirty="0"/>
+              <a:t>Model e.g. Photo metadata</a:t>
+            </a:r>
+          </a:p>
+          <a:p>
+            <a:pPr lvl="1"/>
+            <a:r>
+              <a:rPr lang="en-US" dirty="0"/>
+              <a:t>View e.g. Photo detail page showing photo and metadata</a:t>
+            </a:r>
+          </a:p>
+          <a:p>
+            <a:pPr lvl="1"/>
+            <a:r>
+              <a:rPr lang="en-US" dirty="0"/>
+              <a:t>Controller – the glue e.g. read from </a:t>
+            </a:r>
+            <a:r>
+              <a:rPr lang="en-US" dirty="0" err="1"/>
+              <a:t>db</a:t>
+            </a:r>
+            <a:r>
+              <a:rPr lang="en-US" dirty="0"/>
+              <a:t> and populate </a:t>
+            </a:r>
+            <a:r>
+              <a:rPr lang="en-US" dirty="0" smtClean="0"/>
+              <a:t>template</a:t>
+            </a:r>
+            <a:endParaRPr lang="en-US" dirty="0" smtClean="0"/>
           </a:p>
           <a:p>
             <a:r>
@@ -6153,13 +6376,8 @@
           <a:p>
             <a:r>
               <a:rPr lang="en-US" dirty="0" smtClean="0"/>
-              <a:t>Grails is a Spring MVC App – much </a:t>
-            </a:r>
-            <a:r>
-              <a:rPr lang="en-US" smtClean="0"/>
-              <a:t>simpler!</a:t>
-            </a:r>
-            <a:endParaRPr lang="en-US" dirty="0" smtClean="0"/>
+              <a:t>Grails is a Spring MVC App – much simpler!</a:t>
+            </a:r>
           </a:p>
         </p:txBody>
       </p:sp>

</xml_diff>